<commit_message>
Renamed files, added more presentations
</commit_message>
<xml_diff>
--- a/deep-learning-in-practice-with-pytorch/2-neural-networks-and-pytorch.pptx
+++ b/deep-learning-in-practice-with-pytorch/2-neural-networks-and-pytorch.pptx
@@ -10,6 +10,11 @@
     <p:sldId id="259" r:id="rId4"/>
     <p:sldId id="261" r:id="rId5"/>
     <p:sldId id="260" r:id="rId6"/>
+    <p:sldId id="264" r:id="rId7"/>
+    <p:sldId id="265" r:id="rId8"/>
+    <p:sldId id="266" r:id="rId9"/>
+    <p:sldId id="263" r:id="rId10"/>
+    <p:sldId id="262" r:id="rId11"/>
   </p:sldIdLst>
   <p:sldSz cx="12192000" cy="6858000"/>
   <p:notesSz cx="6858000" cy="9144000"/>
@@ -1378,7 +1383,7 @@
         <p:spPr>
           <a:xfrm>
             <a:off x="1142999" y="6350734"/>
-            <a:ext cx="6716110" cy="253916"/>
+            <a:ext cx="6716110" cy="246221"/>
           </a:xfrm>
           <a:prstGeom prst="rect">
             <a:avLst/>
@@ -1398,23 +1403,8 @@
                 </a:solidFill>
                 <a:latin typeface="+mn-lt"/>
               </a:rPr>
-              <a:t>TITLE OF THE PRESENTATION HERE (MODIFY IN VIEW -&gt; MASK</a:t>
-            </a:r>
-            <a:r>
-              <a:rPr lang="it-IT" sz="1000" baseline="0" dirty="0">
-                <a:solidFill>
-                  <a:srgbClr val="275662"/>
-                </a:solidFill>
-                <a:latin typeface="+mn-lt"/>
-              </a:rPr>
-              <a:t> / AFFICHAGE -&gt; MASQUE DE DIAPOSITIVES) </a:t>
-            </a:r>
-            <a:endParaRPr lang="fr-FR" sz="1000" dirty="0">
-              <a:solidFill>
-                <a:srgbClr val="275662"/>
-              </a:solidFill>
-              <a:latin typeface="+mn-lt"/>
-            </a:endParaRPr>
+              <a:t>REFRESHER ON NEURAL NETWORKS AND PHILOSOPHY OF PYTORCH</a:t>
+            </a:r>
           </a:p>
         </p:txBody>
       </p:sp>
@@ -1826,7 +1816,7 @@
           <a:p>
             <a:r>
               <a:rPr lang="it-IT" sz="6600" dirty="0"/>
-              <a:t>Refresher on Neural Networks + Philosophy of pytorch</a:t>
+              <a:t>Refresher on Neural Networks and Philosophy of pytorch</a:t>
             </a:r>
             <a:endParaRPr lang="fr-FR" sz="6600" dirty="0"/>
           </a:p>
@@ -1897,6 +1887,114 @@
     <p:extLst>
       <p:ext uri="{BB962C8B-B14F-4D97-AF65-F5344CB8AC3E}">
         <p14:creationId xmlns:p14="http://schemas.microsoft.com/office/powerpoint/2010/main" val="1056445254"/>
+      </p:ext>
+    </p:extLst>
+  </p:cSld>
+  <p:clrMapOvr>
+    <a:masterClrMapping/>
+  </p:clrMapOvr>
+</p:sld>
+</file>
+
+<file path=ppt/slides/slide10.xml><?xml version="1.0" encoding="utf-8"?>
+<p:sld xmlns:a="http://schemas.openxmlformats.org/drawingml/2006/main" xmlns:r="http://schemas.openxmlformats.org/officeDocument/2006/relationships" xmlns:p="http://schemas.openxmlformats.org/presentationml/2006/main">
+  <p:cSld>
+    <p:spTree>
+      <p:nvGrpSpPr>
+        <p:cNvPr id="1" name=""/>
+        <p:cNvGrpSpPr/>
+        <p:nvPr/>
+      </p:nvGrpSpPr>
+      <p:grpSpPr>
+        <a:xfrm>
+          <a:off x="0" y="0"/>
+          <a:ext cx="0" cy="0"/>
+          <a:chOff x="0" y="0"/>
+          <a:chExt cx="0" cy="0"/>
+        </a:xfrm>
+      </p:grpSpPr>
+      <p:sp>
+        <p:nvSpPr>
+          <p:cNvPr id="2" name="Titre 1">
+            <a:extLst>
+              <a:ext uri="{FF2B5EF4-FFF2-40B4-BE49-F238E27FC236}">
+                <a16:creationId xmlns:a16="http://schemas.microsoft.com/office/drawing/2014/main" id="{E56F1EB6-DAD9-457F-9439-B1EFD21942EF}"/>
+              </a:ext>
+            </a:extLst>
+          </p:cNvPr>
+          <p:cNvSpPr>
+            <a:spLocks noGrp="1"/>
+          </p:cNvSpPr>
+          <p:nvPr>
+            <p:ph type="title"/>
+          </p:nvPr>
+        </p:nvSpPr>
+        <p:spPr/>
+        <p:txBody>
+          <a:bodyPr/>
+          <a:lstStyle/>
+          <a:p>
+            <a:r>
+              <a:rPr lang="en-US" dirty="0" err="1"/>
+              <a:t>pytorch</a:t>
+            </a:r>
+            <a:r>
+              <a:rPr lang="en-US" dirty="0"/>
+              <a:t> FAQ</a:t>
+            </a:r>
+          </a:p>
+        </p:txBody>
+      </p:sp>
+      <p:sp>
+        <p:nvSpPr>
+          <p:cNvPr id="3" name="Espace réservé du texte 2">
+            <a:extLst>
+              <a:ext uri="{FF2B5EF4-FFF2-40B4-BE49-F238E27FC236}">
+                <a16:creationId xmlns:a16="http://schemas.microsoft.com/office/drawing/2014/main" id="{57CEC01E-0BD0-4703-9F2F-562C1722F7B9}"/>
+              </a:ext>
+            </a:extLst>
+          </p:cNvPr>
+          <p:cNvSpPr>
+            <a:spLocks noGrp="1"/>
+          </p:cNvSpPr>
+          <p:nvPr>
+            <p:ph type="body" sz="quarter" idx="10"/>
+          </p:nvPr>
+        </p:nvSpPr>
+        <p:spPr/>
+        <p:txBody>
+          <a:bodyPr/>
+          <a:lstStyle/>
+          <a:p>
+            <a:r>
+              <a:rPr lang="en-US" dirty="0"/>
+              <a:t>Excellent resource for most common issues</a:t>
+            </a:r>
+          </a:p>
+          <a:p>
+            <a:pPr marL="0" indent="0">
+              <a:buNone/>
+            </a:pPr>
+            <a:r>
+              <a:rPr lang="en-US" dirty="0">
+                <a:hlinkClick r:id="rId2"/>
+              </a:rPr>
+              <a:t>https://pytorch.org/docs/stable/notes/faq.html</a:t>
+            </a:r>
+            <a:endParaRPr lang="en-US" dirty="0"/>
+          </a:p>
+          <a:p>
+            <a:pPr marL="0" indent="0">
+              <a:buNone/>
+            </a:pPr>
+            <a:endParaRPr lang="en-US" dirty="0"/>
+          </a:p>
+        </p:txBody>
+      </p:sp>
+    </p:spTree>
+    <p:extLst>
+      <p:ext uri="{BB962C8B-B14F-4D97-AF65-F5344CB8AC3E}">
+        <p14:creationId xmlns:p14="http://schemas.microsoft.com/office/powerpoint/2010/main" val="451053246"/>
       </p:ext>
     </p:extLst>
   </p:cSld>
@@ -2180,6 +2278,12 @@
               <a:t>Flow of tensors in the network</a:t>
             </a:r>
           </a:p>
+          <a:p>
+            <a:r>
+              <a:rPr lang="en-US" dirty="0"/>
+              <a:t>Input and outputs are interpreted in human-readable way</a:t>
+            </a:r>
+          </a:p>
         </p:txBody>
       </p:sp>
     </p:spTree>
@@ -2343,6 +2447,669 @@
     <p:extLst>
       <p:ext uri="{BB962C8B-B14F-4D97-AF65-F5344CB8AC3E}">
         <p14:creationId xmlns:p14="http://schemas.microsoft.com/office/powerpoint/2010/main" val="3735627836"/>
+      </p:ext>
+    </p:extLst>
+  </p:cSld>
+  <p:clrMapOvr>
+    <a:masterClrMapping/>
+  </p:clrMapOvr>
+</p:sld>
+</file>
+
+<file path=ppt/slides/slide6.xml><?xml version="1.0" encoding="utf-8"?>
+<p:sld xmlns:a="http://schemas.openxmlformats.org/drawingml/2006/main" xmlns:r="http://schemas.openxmlformats.org/officeDocument/2006/relationships" xmlns:p="http://schemas.openxmlformats.org/presentationml/2006/main">
+  <p:cSld>
+    <p:spTree>
+      <p:nvGrpSpPr>
+        <p:cNvPr id="1" name=""/>
+        <p:cNvGrpSpPr/>
+        <p:nvPr/>
+      </p:nvGrpSpPr>
+      <p:grpSpPr>
+        <a:xfrm>
+          <a:off x="0" y="0"/>
+          <a:ext cx="0" cy="0"/>
+          <a:chOff x="0" y="0"/>
+          <a:chExt cx="0" cy="0"/>
+        </a:xfrm>
+      </p:grpSpPr>
+      <p:sp>
+        <p:nvSpPr>
+          <p:cNvPr id="2" name="Titre 1">
+            <a:extLst>
+              <a:ext uri="{FF2B5EF4-FFF2-40B4-BE49-F238E27FC236}">
+                <a16:creationId xmlns:a16="http://schemas.microsoft.com/office/drawing/2014/main" id="{B3883CBF-4872-41DE-9E68-63B9B296A942}"/>
+              </a:ext>
+            </a:extLst>
+          </p:cNvPr>
+          <p:cNvSpPr>
+            <a:spLocks noGrp="1"/>
+          </p:cNvSpPr>
+          <p:nvPr>
+            <p:ph type="title"/>
+          </p:nvPr>
+        </p:nvSpPr>
+        <p:spPr/>
+        <p:txBody>
+          <a:bodyPr/>
+          <a:lstStyle/>
+          <a:p>
+            <a:r>
+              <a:rPr lang="en-US" dirty="0"/>
+              <a:t>Worst enemies of DL (in this class, at least)</a:t>
+            </a:r>
+          </a:p>
+        </p:txBody>
+      </p:sp>
+      <p:sp>
+        <p:nvSpPr>
+          <p:cNvPr id="3" name="Espace réservé du texte 2">
+            <a:extLst>
+              <a:ext uri="{FF2B5EF4-FFF2-40B4-BE49-F238E27FC236}">
+                <a16:creationId xmlns:a16="http://schemas.microsoft.com/office/drawing/2014/main" id="{316D8B43-958B-42A1-80EE-469723338A2A}"/>
+              </a:ext>
+            </a:extLst>
+          </p:cNvPr>
+          <p:cNvSpPr>
+            <a:spLocks noGrp="1"/>
+          </p:cNvSpPr>
+          <p:nvPr>
+            <p:ph type="body" sz="quarter" idx="10"/>
+          </p:nvPr>
+        </p:nvSpPr>
+        <p:spPr/>
+        <p:txBody>
+          <a:bodyPr numCol="2"/>
+          <a:lstStyle/>
+          <a:p>
+            <a:pPr marL="0" indent="0" algn="ctr">
+              <a:buNone/>
+            </a:pPr>
+            <a:r>
+              <a:rPr lang="en-US" sz="4800" dirty="0"/>
+              <a:t>Space</a:t>
+            </a:r>
+          </a:p>
+          <a:p>
+            <a:pPr marL="0" indent="0">
+              <a:buNone/>
+            </a:pPr>
+            <a:endParaRPr lang="en-US" dirty="0"/>
+          </a:p>
+          <a:p>
+            <a:pPr marL="0" indent="0">
+              <a:buNone/>
+            </a:pPr>
+            <a:endParaRPr lang="en-US" dirty="0"/>
+          </a:p>
+          <a:p>
+            <a:pPr marL="0" indent="0">
+              <a:buNone/>
+            </a:pPr>
+            <a:endParaRPr lang="en-US" dirty="0"/>
+          </a:p>
+          <a:p>
+            <a:pPr marL="0" indent="0">
+              <a:buNone/>
+            </a:pPr>
+            <a:endParaRPr lang="en-US" dirty="0"/>
+          </a:p>
+          <a:p>
+            <a:pPr marL="0" indent="0">
+              <a:buNone/>
+            </a:pPr>
+            <a:endParaRPr lang="en-US" dirty="0"/>
+          </a:p>
+          <a:p>
+            <a:pPr marL="0" indent="0">
+              <a:buNone/>
+            </a:pPr>
+            <a:endParaRPr lang="en-US" dirty="0"/>
+          </a:p>
+          <a:p>
+            <a:pPr marL="0" indent="0" algn="ctr">
+              <a:buNone/>
+            </a:pPr>
+            <a:r>
+              <a:rPr lang="en-US" sz="4800" dirty="0"/>
+              <a:t>Time</a:t>
+            </a:r>
+          </a:p>
+        </p:txBody>
+      </p:sp>
+      <p:pic>
+        <p:nvPicPr>
+          <p:cNvPr id="1026" name="Picture 2" descr="What is time? | Space">
+            <a:extLst>
+              <a:ext uri="{FF2B5EF4-FFF2-40B4-BE49-F238E27FC236}">
+                <a16:creationId xmlns:a16="http://schemas.microsoft.com/office/drawing/2014/main" id="{B1E70EBD-0569-4EAF-8853-F3EEA776F17A}"/>
+              </a:ext>
+            </a:extLst>
+          </p:cNvPr>
+          <p:cNvPicPr>
+            <a:picLocks noChangeAspect="1" noChangeArrowheads="1"/>
+          </p:cNvPicPr>
+          <p:nvPr/>
+        </p:nvPicPr>
+        <p:blipFill>
+          <a:blip r:embed="rId2">
+            <a:extLst>
+              <a:ext uri="{28A0092B-C50C-407E-A947-70E740481C1C}">
+                <a14:useLocalDpi xmlns:a14="http://schemas.microsoft.com/office/drawing/2010/main" val="0"/>
+              </a:ext>
+            </a:extLst>
+          </a:blip>
+          <a:srcRect/>
+          <a:stretch>
+            <a:fillRect/>
+          </a:stretch>
+        </p:blipFill>
+        <p:spPr bwMode="auto">
+          <a:xfrm>
+            <a:off x="6152036" y="2198890"/>
+            <a:ext cx="5945015" cy="3344071"/>
+          </a:xfrm>
+          <a:prstGeom prst="rect">
+            <a:avLst/>
+          </a:prstGeom>
+          <a:noFill/>
+          <a:extLst>
+            <a:ext uri="{909E8E84-426E-40DD-AFC4-6F175D3DCCD1}">
+              <a14:hiddenFill xmlns:a14="http://schemas.microsoft.com/office/drawing/2010/main">
+                <a:solidFill>
+                  <a:srgbClr val="FFFFFF"/>
+                </a:solidFill>
+              </a14:hiddenFill>
+            </a:ext>
+          </a:extLst>
+        </p:spPr>
+      </p:pic>
+      <p:pic>
+        <p:nvPicPr>
+          <p:cNvPr id="1030" name="Picture 6" descr="L'espace | Il y a quoi dans l'espace | Qu'est-ce qu'on trouve dans l'espace  | Star Walk">
+            <a:extLst>
+              <a:ext uri="{FF2B5EF4-FFF2-40B4-BE49-F238E27FC236}">
+                <a16:creationId xmlns:a16="http://schemas.microsoft.com/office/drawing/2014/main" id="{FA41CA6D-BBF5-4B78-88A1-C26301AE8C01}"/>
+              </a:ext>
+            </a:extLst>
+          </p:cNvPr>
+          <p:cNvPicPr>
+            <a:picLocks noChangeAspect="1" noChangeArrowheads="1"/>
+          </p:cNvPicPr>
+          <p:nvPr/>
+        </p:nvPicPr>
+        <p:blipFill>
+          <a:blip r:embed="rId3" cstate="print">
+            <a:extLst>
+              <a:ext uri="{28A0092B-C50C-407E-A947-70E740481C1C}">
+                <a14:useLocalDpi xmlns:a14="http://schemas.microsoft.com/office/drawing/2010/main" val="0"/>
+              </a:ext>
+            </a:extLst>
+          </a:blip>
+          <a:srcRect/>
+          <a:stretch>
+            <a:fillRect/>
+          </a:stretch>
+        </p:blipFill>
+        <p:spPr bwMode="auto">
+          <a:xfrm>
+            <a:off x="122706" y="2198891"/>
+            <a:ext cx="5945013" cy="3344070"/>
+          </a:xfrm>
+          <a:prstGeom prst="rect">
+            <a:avLst/>
+          </a:prstGeom>
+          <a:noFill/>
+          <a:extLst>
+            <a:ext uri="{909E8E84-426E-40DD-AFC4-6F175D3DCCD1}">
+              <a14:hiddenFill xmlns:a14="http://schemas.microsoft.com/office/drawing/2010/main">
+                <a:solidFill>
+                  <a:srgbClr val="FFFFFF"/>
+                </a:solidFill>
+              </a14:hiddenFill>
+            </a:ext>
+          </a:extLst>
+        </p:spPr>
+      </p:pic>
+      <p:pic>
+        <p:nvPicPr>
+          <p:cNvPr id="1036" name="Picture 12" descr="Hello world! | hololive English 1st Concert - Connect the World - Supported  By Bushiroad | hololive production">
+            <a:extLst>
+              <a:ext uri="{FF2B5EF4-FFF2-40B4-BE49-F238E27FC236}">
+                <a16:creationId xmlns:a16="http://schemas.microsoft.com/office/drawing/2014/main" id="{40C25DE9-614D-4C68-81FC-C830F53379B2}"/>
+              </a:ext>
+            </a:extLst>
+          </p:cNvPr>
+          <p:cNvPicPr>
+            <a:picLocks noChangeAspect="1" noChangeArrowheads="1"/>
+          </p:cNvPicPr>
+          <p:nvPr/>
+        </p:nvPicPr>
+        <p:blipFill>
+          <a:blip r:embed="rId4">
+            <a:extLst>
+              <a:ext uri="{28A0092B-C50C-407E-A947-70E740481C1C}">
+                <a14:useLocalDpi xmlns:a14="http://schemas.microsoft.com/office/drawing/2010/main" val="0"/>
+              </a:ext>
+            </a:extLst>
+          </a:blip>
+          <a:srcRect/>
+          <a:stretch>
+            <a:fillRect/>
+          </a:stretch>
+        </p:blipFill>
+        <p:spPr bwMode="auto">
+          <a:xfrm>
+            <a:off x="8620091" y="2498103"/>
+            <a:ext cx="4603720" cy="7030072"/>
+          </a:xfrm>
+          <a:prstGeom prst="rect">
+            <a:avLst/>
+          </a:prstGeom>
+          <a:noFill/>
+          <a:extLst>
+            <a:ext uri="{909E8E84-426E-40DD-AFC4-6F175D3DCCD1}">
+              <a14:hiddenFill xmlns:a14="http://schemas.microsoft.com/office/drawing/2010/main">
+                <a:solidFill>
+                  <a:srgbClr val="FFFFFF"/>
+                </a:solidFill>
+              </a14:hiddenFill>
+            </a:ext>
+          </a:extLst>
+        </p:spPr>
+      </p:pic>
+      <p:pic>
+        <p:nvPicPr>
+          <p:cNvPr id="1038" name="Picture 14" descr="Tsukumo Sana (Hololive) Render by TheGreatKaio on DeviantArt">
+            <a:extLst>
+              <a:ext uri="{FF2B5EF4-FFF2-40B4-BE49-F238E27FC236}">
+                <a16:creationId xmlns:a16="http://schemas.microsoft.com/office/drawing/2014/main" id="{EA9DF239-FF82-4C79-9076-711D3BBC7040}"/>
+              </a:ext>
+            </a:extLst>
+          </p:cNvPr>
+          <p:cNvPicPr>
+            <a:picLocks noChangeAspect="1" noChangeArrowheads="1"/>
+          </p:cNvPicPr>
+          <p:nvPr/>
+        </p:nvPicPr>
+        <p:blipFill rotWithShape="1">
+          <a:blip r:embed="rId5">
+            <a:extLst>
+              <a:ext uri="{28A0092B-C50C-407E-A947-70E740481C1C}">
+                <a14:useLocalDpi xmlns:a14="http://schemas.microsoft.com/office/drawing/2010/main" val="0"/>
+              </a:ext>
+            </a:extLst>
+          </a:blip>
+          <a:srcRect l="12079" r="15619"/>
+          <a:stretch/>
+        </p:blipFill>
+        <p:spPr bwMode="auto">
+          <a:xfrm>
+            <a:off x="0" y="2291965"/>
+            <a:ext cx="4544462" cy="6285354"/>
+          </a:xfrm>
+          <a:prstGeom prst="rect">
+            <a:avLst/>
+          </a:prstGeom>
+          <a:noFill/>
+          <a:extLst>
+            <a:ext uri="{909E8E84-426E-40DD-AFC4-6F175D3DCCD1}">
+              <a14:hiddenFill xmlns:a14="http://schemas.microsoft.com/office/drawing/2010/main">
+                <a:solidFill>
+                  <a:srgbClr val="FFFFFF"/>
+                </a:solidFill>
+              </a14:hiddenFill>
+            </a:ext>
+          </a:extLst>
+        </p:spPr>
+      </p:pic>
+    </p:spTree>
+    <p:extLst>
+      <p:ext uri="{BB962C8B-B14F-4D97-AF65-F5344CB8AC3E}">
+        <p14:creationId xmlns:p14="http://schemas.microsoft.com/office/powerpoint/2010/main" val="558540251"/>
+      </p:ext>
+    </p:extLst>
+  </p:cSld>
+  <p:clrMapOvr>
+    <a:masterClrMapping/>
+  </p:clrMapOvr>
+</p:sld>
+</file>
+
+<file path=ppt/slides/slide7.xml><?xml version="1.0" encoding="utf-8"?>
+<p:sld xmlns:a="http://schemas.openxmlformats.org/drawingml/2006/main" xmlns:r="http://schemas.openxmlformats.org/officeDocument/2006/relationships" xmlns:p="http://schemas.openxmlformats.org/presentationml/2006/main">
+  <p:cSld>
+    <p:spTree>
+      <p:nvGrpSpPr>
+        <p:cNvPr id="1" name=""/>
+        <p:cNvGrpSpPr/>
+        <p:nvPr/>
+      </p:nvGrpSpPr>
+      <p:grpSpPr>
+        <a:xfrm>
+          <a:off x="0" y="0"/>
+          <a:ext cx="0" cy="0"/>
+          <a:chOff x="0" y="0"/>
+          <a:chExt cx="0" cy="0"/>
+        </a:xfrm>
+      </p:grpSpPr>
+      <p:sp>
+        <p:nvSpPr>
+          <p:cNvPr id="2" name="Titre 1">
+            <a:extLst>
+              <a:ext uri="{FF2B5EF4-FFF2-40B4-BE49-F238E27FC236}">
+                <a16:creationId xmlns:a16="http://schemas.microsoft.com/office/drawing/2014/main" id="{F7178487-21D2-4119-B6A2-CDA059BD5409}"/>
+              </a:ext>
+            </a:extLst>
+          </p:cNvPr>
+          <p:cNvSpPr>
+            <a:spLocks noGrp="1"/>
+          </p:cNvSpPr>
+          <p:nvPr>
+            <p:ph type="title"/>
+          </p:nvPr>
+        </p:nvSpPr>
+        <p:spPr/>
+        <p:txBody>
+          <a:bodyPr/>
+          <a:lstStyle/>
+          <a:p>
+            <a:r>
+              <a:rPr lang="en-US" dirty="0"/>
+              <a:t>Worst enemies of DL (in this class, at least)</a:t>
+            </a:r>
+          </a:p>
+        </p:txBody>
+      </p:sp>
+      <p:sp>
+        <p:nvSpPr>
+          <p:cNvPr id="3" name="Espace réservé du texte 2">
+            <a:extLst>
+              <a:ext uri="{FF2B5EF4-FFF2-40B4-BE49-F238E27FC236}">
+                <a16:creationId xmlns:a16="http://schemas.microsoft.com/office/drawing/2014/main" id="{CB3F25C9-C9B4-44C8-9A0E-1B9AA75395AE}"/>
+              </a:ext>
+            </a:extLst>
+          </p:cNvPr>
+          <p:cNvSpPr>
+            <a:spLocks noGrp="1"/>
+          </p:cNvSpPr>
+          <p:nvPr>
+            <p:ph type="body" sz="quarter" idx="10"/>
+          </p:nvPr>
+        </p:nvSpPr>
+        <p:spPr/>
+        <p:txBody>
+          <a:bodyPr/>
+          <a:lstStyle/>
+          <a:p>
+            <a:r>
+              <a:rPr lang="en-US" dirty="0"/>
+              <a:t>(Disk) Space</a:t>
+            </a:r>
+          </a:p>
+          <a:p>
+            <a:pPr lvl="1"/>
+            <a:r>
+              <a:rPr lang="en-US" dirty="0"/>
+              <a:t>Modern DL models contain </a:t>
+            </a:r>
+            <a:r>
+              <a:rPr lang="en-US" b="1" dirty="0"/>
+              <a:t>billions</a:t>
+            </a:r>
+            <a:r>
+              <a:rPr lang="en-US" dirty="0"/>
+              <a:t> of parameters</a:t>
+            </a:r>
+          </a:p>
+          <a:p>
+            <a:pPr lvl="1"/>
+            <a:r>
+              <a:rPr lang="en-US" dirty="0"/>
+              <a:t>GPT-4 has ~220 billion parameters</a:t>
+            </a:r>
+          </a:p>
+          <a:p>
+            <a:pPr lvl="1"/>
+            <a:r>
+              <a:rPr lang="en-US" dirty="0"/>
+              <a:t>If a single parameter is a floating point represented on 32 bits…</a:t>
+            </a:r>
+          </a:p>
+          <a:p>
+            <a:pPr lvl="1"/>
+            <a:r>
+              <a:rPr lang="en-US" dirty="0"/>
+              <a:t>…that is 220 * 10</a:t>
+            </a:r>
+            <a:r>
+              <a:rPr lang="en-US" baseline="30000" dirty="0"/>
+              <a:t>9</a:t>
+            </a:r>
+            <a:r>
+              <a:rPr lang="en-US" dirty="0"/>
+              <a:t> * 32 / 8 = 880 Giga Bytes (!!!)</a:t>
+            </a:r>
+          </a:p>
+          <a:p>
+            <a:pPr lvl="1"/>
+            <a:r>
+              <a:rPr lang="en-US" dirty="0"/>
+              <a:t>They have to be stored on a hard drive and IN MEMORY!</a:t>
+            </a:r>
+          </a:p>
+          <a:p>
+            <a:pPr lvl="1"/>
+            <a:r>
+              <a:rPr lang="en-US" dirty="0"/>
+              <a:t>During training, you’ll need to store the gradient IN MEMORY!</a:t>
+            </a:r>
+          </a:p>
+          <a:p>
+            <a:pPr lvl="1"/>
+            <a:endParaRPr lang="en-US" dirty="0"/>
+          </a:p>
+        </p:txBody>
+      </p:sp>
+    </p:spTree>
+    <p:extLst>
+      <p:ext uri="{BB962C8B-B14F-4D97-AF65-F5344CB8AC3E}">
+        <p14:creationId xmlns:p14="http://schemas.microsoft.com/office/powerpoint/2010/main" val="2039122127"/>
+      </p:ext>
+    </p:extLst>
+  </p:cSld>
+  <p:clrMapOvr>
+    <a:masterClrMapping/>
+  </p:clrMapOvr>
+</p:sld>
+</file>
+
+<file path=ppt/slides/slide8.xml><?xml version="1.0" encoding="utf-8"?>
+<p:sld xmlns:a="http://schemas.openxmlformats.org/drawingml/2006/main" xmlns:r="http://schemas.openxmlformats.org/officeDocument/2006/relationships" xmlns:p="http://schemas.openxmlformats.org/presentationml/2006/main">
+  <p:cSld>
+    <p:spTree>
+      <p:nvGrpSpPr>
+        <p:cNvPr id="1" name=""/>
+        <p:cNvGrpSpPr/>
+        <p:nvPr/>
+      </p:nvGrpSpPr>
+      <p:grpSpPr>
+        <a:xfrm>
+          <a:off x="0" y="0"/>
+          <a:ext cx="0" cy="0"/>
+          <a:chOff x="0" y="0"/>
+          <a:chExt cx="0" cy="0"/>
+        </a:xfrm>
+      </p:grpSpPr>
+      <p:sp>
+        <p:nvSpPr>
+          <p:cNvPr id="2" name="Titre 1">
+            <a:extLst>
+              <a:ext uri="{FF2B5EF4-FFF2-40B4-BE49-F238E27FC236}">
+                <a16:creationId xmlns:a16="http://schemas.microsoft.com/office/drawing/2014/main" id="{6ECBC317-2889-4ADC-9D07-47EE7E39E603}"/>
+              </a:ext>
+            </a:extLst>
+          </p:cNvPr>
+          <p:cNvSpPr>
+            <a:spLocks noGrp="1"/>
+          </p:cNvSpPr>
+          <p:nvPr>
+            <p:ph type="title"/>
+          </p:nvPr>
+        </p:nvSpPr>
+        <p:spPr/>
+        <p:txBody>
+          <a:bodyPr/>
+          <a:lstStyle/>
+          <a:p>
+            <a:r>
+              <a:rPr lang="en-US" dirty="0"/>
+              <a:t>Worst enemies of DL (in this class, at least)</a:t>
+            </a:r>
+          </a:p>
+        </p:txBody>
+      </p:sp>
+      <p:sp>
+        <p:nvSpPr>
+          <p:cNvPr id="3" name="Espace réservé du texte 2">
+            <a:extLst>
+              <a:ext uri="{FF2B5EF4-FFF2-40B4-BE49-F238E27FC236}">
+                <a16:creationId xmlns:a16="http://schemas.microsoft.com/office/drawing/2014/main" id="{5C016B1E-4FBB-41EE-9A71-17A49DA367AF}"/>
+              </a:ext>
+            </a:extLst>
+          </p:cNvPr>
+          <p:cNvSpPr>
+            <a:spLocks noGrp="1"/>
+          </p:cNvSpPr>
+          <p:nvPr>
+            <p:ph type="body" sz="quarter" idx="10"/>
+          </p:nvPr>
+        </p:nvSpPr>
+        <p:spPr/>
+        <p:txBody>
+          <a:bodyPr/>
+          <a:lstStyle/>
+          <a:p>
+            <a:r>
+              <a:rPr lang="en-US" dirty="0"/>
+              <a:t>(Training) Time</a:t>
+            </a:r>
+          </a:p>
+          <a:p>
+            <a:pPr lvl="1"/>
+            <a:r>
+              <a:rPr lang="en-US" dirty="0"/>
+              <a:t>Training iterations take a lot of time</a:t>
+            </a:r>
+          </a:p>
+          <a:p>
+            <a:pPr lvl="1"/>
+            <a:endParaRPr lang="en-US" dirty="0"/>
+          </a:p>
+          <a:p>
+            <a:pPr lvl="1"/>
+            <a:endParaRPr lang="en-US" dirty="0"/>
+          </a:p>
+        </p:txBody>
+      </p:sp>
+    </p:spTree>
+    <p:extLst>
+      <p:ext uri="{BB962C8B-B14F-4D97-AF65-F5344CB8AC3E}">
+        <p14:creationId xmlns:p14="http://schemas.microsoft.com/office/powerpoint/2010/main" val="624002364"/>
+      </p:ext>
+    </p:extLst>
+  </p:cSld>
+  <p:clrMapOvr>
+    <a:masterClrMapping/>
+  </p:clrMapOvr>
+</p:sld>
+</file>
+
+<file path=ppt/slides/slide9.xml><?xml version="1.0" encoding="utf-8"?>
+<p:sld xmlns:a="http://schemas.openxmlformats.org/drawingml/2006/main" xmlns:r="http://schemas.openxmlformats.org/officeDocument/2006/relationships" xmlns:p="http://schemas.openxmlformats.org/presentationml/2006/main">
+  <p:cSld>
+    <p:spTree>
+      <p:nvGrpSpPr>
+        <p:cNvPr id="1" name=""/>
+        <p:cNvGrpSpPr/>
+        <p:nvPr/>
+      </p:nvGrpSpPr>
+      <p:grpSpPr>
+        <a:xfrm>
+          <a:off x="0" y="0"/>
+          <a:ext cx="0" cy="0"/>
+          <a:chOff x="0" y="0"/>
+          <a:chExt cx="0" cy="0"/>
+        </a:xfrm>
+      </p:grpSpPr>
+      <p:sp>
+        <p:nvSpPr>
+          <p:cNvPr id="2" name="Titre 1">
+            <a:extLst>
+              <a:ext uri="{FF2B5EF4-FFF2-40B4-BE49-F238E27FC236}">
+                <a16:creationId xmlns:a16="http://schemas.microsoft.com/office/drawing/2014/main" id="{6426C41E-F5B5-46E1-9300-CDF4D0CDB48C}"/>
+              </a:ext>
+            </a:extLst>
+          </p:cNvPr>
+          <p:cNvSpPr>
+            <a:spLocks noGrp="1"/>
+          </p:cNvSpPr>
+          <p:nvPr>
+            <p:ph type="title"/>
+          </p:nvPr>
+        </p:nvSpPr>
+        <p:spPr/>
+        <p:txBody>
+          <a:bodyPr/>
+          <a:lstStyle/>
+          <a:p>
+            <a:r>
+              <a:rPr lang="en-US" dirty="0"/>
+              <a:t>Practical issues with neural networks</a:t>
+            </a:r>
+          </a:p>
+        </p:txBody>
+      </p:sp>
+      <p:sp>
+        <p:nvSpPr>
+          <p:cNvPr id="3" name="Espace réservé du texte 2">
+            <a:extLst>
+              <a:ext uri="{FF2B5EF4-FFF2-40B4-BE49-F238E27FC236}">
+                <a16:creationId xmlns:a16="http://schemas.microsoft.com/office/drawing/2014/main" id="{18C8B6D5-CEBE-4093-B9A8-58ADC56A9201}"/>
+              </a:ext>
+            </a:extLst>
+          </p:cNvPr>
+          <p:cNvSpPr>
+            <a:spLocks noGrp="1"/>
+          </p:cNvSpPr>
+          <p:nvPr>
+            <p:ph type="body" sz="quarter" idx="10"/>
+          </p:nvPr>
+        </p:nvSpPr>
+        <p:spPr/>
+        <p:txBody>
+          <a:bodyPr/>
+          <a:lstStyle/>
+          <a:p>
+            <a:r>
+              <a:rPr lang="en-US" dirty="0"/>
+              <a:t>Size of parameters (</a:t>
+            </a:r>
+            <a:r>
+              <a:rPr lang="en-US" dirty="0" err="1"/>
+              <a:t>downcasting</a:t>
+            </a:r>
+            <a:r>
+              <a:rPr lang="en-US" dirty="0"/>
+              <a:t>)</a:t>
+            </a:r>
+          </a:p>
+        </p:txBody>
+      </p:sp>
+    </p:spTree>
+    <p:extLst>
+      <p:ext uri="{BB962C8B-B14F-4D97-AF65-F5344CB8AC3E}">
+        <p14:creationId xmlns:p14="http://schemas.microsoft.com/office/powerpoint/2010/main" val="1196191067"/>
       </p:ext>
     </p:extLst>
   </p:cSld>

</xml_diff>